<commit_message>
Modelisation error fix - split dataset corrected
</commit_message>
<xml_diff>
--- a/Projet final.pptx
+++ b/Projet final.pptx
@@ -109,6 +109,11 @@
       </a:defRPr>
     </a:lvl9pPr>
   </p:defaultTextStyle>
+  <p:extLst>
+    <p:ext uri="{EFAFB233-063F-42B5-8137-9DF3F51BA10A}">
+      <p15:sldGuideLst xmlns:p15="http://schemas.microsoft.com/office/powerpoint/2012/main"/>
+    </p:ext>
+  </p:extLst>
 </p:presentation>
 </file>
 
@@ -6402,7 +6407,7 @@
                   </a:schemeClr>
                 </a:solidFill>
               </a:rPr>
-              <a:t>Voici les résultats obtenus sur le jeu d’apprentissage pour les modèles ayant un score supérieur à 90%. Les algorithmes de </a:t>
+              <a:t>Voici les résultats obtenus sur le jeu d’apprentissage pour les modèles ayant un score supérieur à 94%. Les algorithmes de </a:t>
             </a:r>
             <a:r>
               <a:rPr lang="fr-FR" dirty="0" err="1">
@@ -6437,12 +6442,10 @@
                   </a:schemeClr>
                 </a:solidFill>
               </a:rPr>
-              <a:t>Le meilleur modèle est le CART. Nous allons donc l’appliquer au jeu de test.</a:t>
-            </a:r>
-          </a:p>
-          <a:p>
-            <a:r>
-              <a:rPr lang="fr-FR" dirty="0">
+              <a:t>Le meilleur modèle est le Gradient </a:t>
+            </a:r>
+            <a:r>
+              <a:rPr lang="fr-FR" dirty="0" err="1">
                 <a:solidFill>
                   <a:schemeClr val="bg1">
                     <a:lumMod val="85000"/>
@@ -6450,10 +6453,10 @@
                   </a:schemeClr>
                 </a:solidFill>
               </a:rPr>
-              <a:t>Là encore, l’</a:t>
-            </a:r>
-            <a:r>
-              <a:rPr lang="fr-FR" dirty="0" err="1">
+              <a:t>Boosting</a:t>
+            </a:r>
+            <a:r>
+              <a:rPr lang="fr-FR" dirty="0">
                 <a:solidFill>
                   <a:schemeClr val="bg1">
                     <a:lumMod val="85000"/>
@@ -6461,8 +6464,10 @@
                   </a:schemeClr>
                 </a:solidFill>
               </a:rPr>
-              <a:t>accuracy</a:t>
-            </a:r>
+              <a:t>. Nous allons donc l’appliquer au jeu de test.</a:t>
+            </a:r>
+          </a:p>
+          <a:p>
             <a:r>
               <a:rPr lang="fr-FR" dirty="0">
                 <a:solidFill>
@@ -6472,12 +6477,10 @@
                   </a:schemeClr>
                 </a:solidFill>
               </a:rPr>
-              <a:t> du modèle CART est de 100%. Cela signifie que l’algorithme explique parfaitement la classe d’un block par les variables. </a:t>
-            </a:r>
-          </a:p>
-          <a:p>
-            <a:r>
-              <a:rPr lang="fr-FR" dirty="0">
+              <a:t>L’</a:t>
+            </a:r>
+            <a:r>
+              <a:rPr lang="fr-FR" dirty="0" err="1">
                 <a:solidFill>
                   <a:schemeClr val="bg1">
                     <a:lumMod val="85000"/>
@@ -6485,7 +6488,31 @@
                   </a:schemeClr>
                 </a:solidFill>
               </a:rPr>
-              <a:t>Puisque sur des observations jamais vues auparavant, l’algorithme a une précision de 100%, il n’y a pas de sur-apprentissage.</a:t>
+              <a:t>accuracy</a:t>
+            </a:r>
+            <a:r>
+              <a:rPr lang="fr-FR" dirty="0">
+                <a:solidFill>
+                  <a:schemeClr val="bg1">
+                    <a:lumMod val="85000"/>
+                    <a:lumOff val="15000"/>
+                  </a:schemeClr>
+                </a:solidFill>
+              </a:rPr>
+              <a:t> du modèle GB est de 97%. Cela signifie que l’algorithme explique avec une bonne précision la classe d’un block par les variables. </a:t>
+            </a:r>
+          </a:p>
+          <a:p>
+            <a:r>
+              <a:rPr lang="fr-FR" dirty="0">
+                <a:solidFill>
+                  <a:schemeClr val="bg1">
+                    <a:lumMod val="85000"/>
+                    <a:lumOff val="15000"/>
+                  </a:schemeClr>
+                </a:solidFill>
+              </a:rPr>
+              <a:t>Puisque sur des observations jamais vues auparavant, l’algorithme a une précision de 97%, il n’y a pas de sur-apprentissage.</a:t>
             </a:r>
           </a:p>
           <a:p>
@@ -6512,10 +6539,10 @@
       </p:sp>
       <p:pic>
         <p:nvPicPr>
-          <p:cNvPr id="7" name="Image 6">
+          <p:cNvPr id="4" name="Image 3">
             <a:extLst>
               <a:ext uri="{FF2B5EF4-FFF2-40B4-BE49-F238E27FC236}">
-                <a16:creationId xmlns:a16="http://schemas.microsoft.com/office/drawing/2014/main" id="{A0180D1F-620C-4932-AF78-86A90121E423}"/>
+                <a16:creationId xmlns:a16="http://schemas.microsoft.com/office/drawing/2014/main" id="{2424946C-A1DD-4F73-817C-CF4611C80F45}"/>
               </a:ext>
             </a:extLst>
           </p:cNvPr>
@@ -6532,8 +6559,8 @@
         </p:blipFill>
         <p:spPr>
           <a:xfrm>
-            <a:off x="7688103" y="684146"/>
-            <a:ext cx="4162152" cy="2769934"/>
+            <a:off x="7620000" y="131084"/>
+            <a:ext cx="4265771" cy="2964541"/>
           </a:xfrm>
           <a:prstGeom prst="rect">
             <a:avLst/>
@@ -6542,10 +6569,10 @@
       </p:pic>
       <p:pic>
         <p:nvPicPr>
-          <p:cNvPr id="8" name="Image 7">
+          <p:cNvPr id="5" name="Image 4">
             <a:extLst>
               <a:ext uri="{FF2B5EF4-FFF2-40B4-BE49-F238E27FC236}">
-                <a16:creationId xmlns:a16="http://schemas.microsoft.com/office/drawing/2014/main" id="{79EE0077-0803-47C9-8ED4-F02DF937DFE5}"/>
+                <a16:creationId xmlns:a16="http://schemas.microsoft.com/office/drawing/2014/main" id="{B71733AF-F195-4719-91BB-FFADF741EF53}"/>
               </a:ext>
             </a:extLst>
           </p:cNvPr>
@@ -6562,8 +6589,8 @@
         </p:blipFill>
         <p:spPr>
           <a:xfrm>
-            <a:off x="8544068" y="4334934"/>
-            <a:ext cx="2457450" cy="371475"/>
+            <a:off x="7855483" y="3650341"/>
+            <a:ext cx="3794804" cy="326116"/>
           </a:xfrm>
           <a:prstGeom prst="rect">
             <a:avLst/>

</xml_diff>